<commit_message>
Cleaned up and finished Part8_Methods.
</commit_message>
<xml_diff>
--- a/2022/Part8_Methods/PowerPoint/Methods.pptx
+++ b/2022/Part8_Methods/PowerPoint/Methods.pptx
@@ -1438,7 +1438,7 @@
             <a:fld id="{B61BEF0D-F0BB-DE4B-95CE-6DB70DBA9567}" type="datetimeFigureOut">
               <a:rPr lang="en-US" smtClean="0"/>
               <a:pPr/>
-              <a:t>11/16/2021</a:t>
+              <a:t>11/17/2021</a:t>
             </a:fld>
             <a:endParaRPr lang="en-US" dirty="0"/>
           </a:p>
@@ -1764,7 +1764,7 @@
             <a:fld id="{B61BEF0D-F0BB-DE4B-95CE-6DB70DBA9567}" type="datetimeFigureOut">
               <a:rPr lang="en-US" smtClean="0"/>
               <a:pPr/>
-              <a:t>11/16/2021</a:t>
+              <a:t>11/17/2021</a:t>
             </a:fld>
             <a:endParaRPr lang="en-US" dirty="0"/>
           </a:p>
@@ -2014,7 +2014,7 @@
             <a:fld id="{B61BEF0D-F0BB-DE4B-95CE-6DB70DBA9567}" type="datetimeFigureOut">
               <a:rPr lang="en-US" smtClean="0"/>
               <a:pPr/>
-              <a:t>11/16/2021</a:t>
+              <a:t>11/17/2021</a:t>
             </a:fld>
             <a:endParaRPr lang="en-US" dirty="0"/>
           </a:p>
@@ -2355,7 +2355,7 @@
             <a:fld id="{B61BEF0D-F0BB-DE4B-95CE-6DB70DBA9567}" type="datetimeFigureOut">
               <a:rPr lang="en-US" smtClean="0"/>
               <a:pPr/>
-              <a:t>11/16/2021</a:t>
+              <a:t>11/17/2021</a:t>
             </a:fld>
             <a:endParaRPr lang="en-US" dirty="0"/>
           </a:p>
@@ -2704,7 +2704,7 @@
             <a:fld id="{B61BEF0D-F0BB-DE4B-95CE-6DB70DBA9567}" type="datetimeFigureOut">
               <a:rPr lang="en-US" smtClean="0"/>
               <a:pPr/>
-              <a:t>11/16/2021</a:t>
+              <a:t>11/17/2021</a:t>
             </a:fld>
             <a:endParaRPr lang="en-US" dirty="0"/>
           </a:p>
@@ -3080,7 +3080,7 @@
             <a:fld id="{B61BEF0D-F0BB-DE4B-95CE-6DB70DBA9567}" type="datetimeFigureOut">
               <a:rPr lang="en-US" smtClean="0"/>
               <a:pPr/>
-              <a:t>11/16/2021</a:t>
+              <a:t>11/17/2021</a:t>
             </a:fld>
             <a:endParaRPr lang="en-US" dirty="0"/>
           </a:p>
@@ -3552,7 +3552,7 @@
             <a:fld id="{B61BEF0D-F0BB-DE4B-95CE-6DB70DBA9567}" type="datetimeFigureOut">
               <a:rPr lang="en-US" smtClean="0"/>
               <a:pPr/>
-              <a:t>11/16/2021</a:t>
+              <a:t>11/17/2021</a:t>
             </a:fld>
             <a:endParaRPr lang="en-US" dirty="0"/>
           </a:p>
@@ -3759,7 +3759,7 @@
             <a:fld id="{B61BEF0D-F0BB-DE4B-95CE-6DB70DBA9567}" type="datetimeFigureOut">
               <a:rPr lang="en-US" smtClean="0"/>
               <a:pPr/>
-              <a:t>11/16/2021</a:t>
+              <a:t>11/17/2021</a:t>
             </a:fld>
             <a:endParaRPr lang="en-US" dirty="0"/>
           </a:p>
@@ -3972,7 +3972,7 @@
             <a:fld id="{B61BEF0D-F0BB-DE4B-95CE-6DB70DBA9567}" type="datetimeFigureOut">
               <a:rPr lang="en-US" smtClean="0"/>
               <a:pPr/>
-              <a:t>11/16/2021</a:t>
+              <a:t>11/17/2021</a:t>
             </a:fld>
             <a:endParaRPr lang="en-US" dirty="0"/>
           </a:p>
@@ -4205,7 +4205,7 @@
           <a:p>
             <a:fld id="{05BFA754-D5C3-4E66-96A6-867B257F58DC}" type="datetimeFigureOut">
               <a:rPr lang="en-US" smtClean="0"/>
-              <a:t>11/16/2021</a:t>
+              <a:t>11/17/2021</a:t>
             </a:fld>
             <a:endParaRPr lang="en-US" dirty="0"/>
           </a:p>
@@ -4454,7 +4454,7 @@
             <a:fld id="{B61BEF0D-F0BB-DE4B-95CE-6DB70DBA9567}" type="datetimeFigureOut">
               <a:rPr lang="en-US" smtClean="0"/>
               <a:pPr/>
-              <a:t>11/16/2021</a:t>
+              <a:t>11/17/2021</a:t>
             </a:fld>
             <a:endParaRPr lang="en-US" dirty="0"/>
           </a:p>
@@ -4753,7 +4753,7 @@
           <a:p>
             <a:fld id="{05BFA754-D5C3-4E66-96A6-867B257F58DC}" type="datetimeFigureOut">
               <a:rPr lang="en-US" smtClean="0"/>
-              <a:t>11/16/2021</a:t>
+              <a:t>11/17/2021</a:t>
             </a:fld>
             <a:endParaRPr lang="en-US" dirty="0"/>
           </a:p>
@@ -5148,7 +5148,7 @@
             <a:fld id="{B61BEF0D-F0BB-DE4B-95CE-6DB70DBA9567}" type="datetimeFigureOut">
               <a:rPr lang="en-US" smtClean="0"/>
               <a:pPr/>
-              <a:t>11/16/2021</a:t>
+              <a:t>11/17/2021</a:t>
             </a:fld>
             <a:endParaRPr lang="en-US" dirty="0"/>
           </a:p>
@@ -5299,7 +5299,7 @@
             <a:fld id="{B61BEF0D-F0BB-DE4B-95CE-6DB70DBA9567}" type="datetimeFigureOut">
               <a:rPr lang="en-US" smtClean="0"/>
               <a:pPr/>
-              <a:t>11/16/2021</a:t>
+              <a:t>11/17/2021</a:t>
             </a:fld>
             <a:endParaRPr lang="en-US" dirty="0"/>
           </a:p>
@@ -5427,7 +5427,7 @@
             <a:fld id="{B61BEF0D-F0BB-DE4B-95CE-6DB70DBA9567}" type="datetimeFigureOut">
               <a:rPr lang="en-US" smtClean="0"/>
               <a:pPr/>
-              <a:t>11/16/2021</a:t>
+              <a:t>11/17/2021</a:t>
             </a:fld>
             <a:endParaRPr lang="en-US" dirty="0"/>
           </a:p>
@@ -5684,7 +5684,7 @@
             <a:fld id="{B61BEF0D-F0BB-DE4B-95CE-6DB70DBA9567}" type="datetimeFigureOut">
               <a:rPr lang="en-US" smtClean="0"/>
               <a:pPr/>
-              <a:t>11/16/2021</a:t>
+              <a:t>11/17/2021</a:t>
             </a:fld>
             <a:endParaRPr lang="en-US" dirty="0"/>
           </a:p>
@@ -6001,7 +6001,7 @@
             <a:fld id="{B61BEF0D-F0BB-DE4B-95CE-6DB70DBA9567}" type="datetimeFigureOut">
               <a:rPr lang="en-US" smtClean="0"/>
               <a:pPr/>
-              <a:t>11/16/2021</a:t>
+              <a:t>11/17/2021</a:t>
             </a:fld>
             <a:endParaRPr lang="en-US" dirty="0"/>
           </a:p>
@@ -6354,7 +6354,7 @@
             <a:fld id="{B61BEF0D-F0BB-DE4B-95CE-6DB70DBA9567}" type="datetimeFigureOut">
               <a:rPr lang="en-US" smtClean="0"/>
               <a:pPr/>
-              <a:t>11/16/2021</a:t>
+              <a:t>11/17/2021</a:t>
             </a:fld>
             <a:endParaRPr lang="en-US" dirty="0"/>
           </a:p>
@@ -6952,6 +6952,12 @@
               <a:t>IT-1050, November 2021</a:t>
             </a:r>
           </a:p>
+          <a:p>
+            <a:r>
+              <a:rPr lang="en-US" dirty="0"/>
+              <a:t>D. Santos</a:t>
+            </a:r>
+          </a:p>
         </p:txBody>
       </p:sp>
     </p:spTree>
@@ -9971,7 +9977,189 @@
               <a:buNone/>
             </a:pPr>
             <a:r>
-              <a:rPr lang="en-US" sz="2000" dirty="0">
+              <a:rPr lang="en-US" sz="1600" dirty="0">
+                <a:solidFill>
+                  <a:srgbClr val="0070C0"/>
+                </a:solidFill>
+                <a:latin typeface="Abadi" panose="020B0604020202020204" pitchFamily="34" charset="0"/>
+                <a:hlinkClick r:id="rId2">
+                  <a:extLst>
+                    <a:ext uri="{A12FA001-AC4F-418D-AE19-62706E023703}">
+                      <ahyp:hlinkClr xmlns:ahyp="http://schemas.microsoft.com/office/drawing/2018/hyperlinkcolor" val="tx"/>
+                    </a:ext>
+                  </a:extLst>
+                </a:hlinkClick>
+              </a:rPr>
+              <a:t>https://github.com/DonnieSantos</a:t>
+            </a:r>
+          </a:p>
+          <a:p>
+            <a:pPr marL="0" indent="0">
+              <a:buNone/>
+            </a:pPr>
+            <a:endParaRPr lang="en-US" sz="1600" dirty="0">
+              <a:solidFill>
+                <a:srgbClr val="0070C0"/>
+              </a:solidFill>
+              <a:latin typeface="Abadi" panose="020B0604020202020204" pitchFamily="34" charset="0"/>
+              <a:hlinkClick r:id="rId3">
+                <a:extLst>
+                  <a:ext uri="{A12FA001-AC4F-418D-AE19-62706E023703}">
+                    <ahyp:hlinkClr xmlns:ahyp="http://schemas.microsoft.com/office/drawing/2018/hyperlinkcolor" val="tx"/>
+                  </a:ext>
+                </a:extLst>
+              </a:hlinkClick>
+            </a:endParaRPr>
+          </a:p>
+          <a:p>
+            <a:pPr marL="0" indent="0">
+              <a:buNone/>
+            </a:pPr>
+            <a:r>
+              <a:rPr lang="en-US" sz="1600" dirty="0">
+                <a:solidFill>
+                  <a:srgbClr val="0070C0"/>
+                </a:solidFill>
+                <a:latin typeface="Abadi" panose="020B0604020202020204" pitchFamily="34" charset="0"/>
+                <a:hlinkClick r:id="rId3">
+                  <a:extLst>
+                    <a:ext uri="{A12FA001-AC4F-418D-AE19-62706E023703}">
+                      <ahyp:hlinkClr xmlns:ahyp="http://schemas.microsoft.com/office/drawing/2018/hyperlinkcolor" val="tx"/>
+                    </a:ext>
+                  </a:extLst>
+                </a:hlinkClick>
+              </a:rPr>
+              <a:t>https://dotnetfiddle.net/lfCg0C</a:t>
+            </a:r>
+            <a:r>
+              <a:rPr lang="en-US" sz="1600" dirty="0">
+                <a:solidFill>
+                  <a:srgbClr val="0070C0"/>
+                </a:solidFill>
+                <a:latin typeface="Abadi" panose="020B0604020202020204" pitchFamily="34" charset="0"/>
+              </a:rPr>
+              <a:t>	 	</a:t>
+            </a:r>
+            <a:r>
+              <a:rPr lang="en-US" sz="1200" dirty="0">
+                <a:solidFill>
+                  <a:schemeClr val="tx1"/>
+                </a:solidFill>
+                <a:latin typeface="Abadi" panose="020B0604020202020204" pitchFamily="34" charset="0"/>
+              </a:rPr>
+              <a:t>(quick introduction)</a:t>
+            </a:r>
+            <a:endParaRPr lang="en-US" sz="1600" dirty="0">
+              <a:solidFill>
+                <a:schemeClr val="tx1"/>
+              </a:solidFill>
+              <a:latin typeface="Abadi" panose="020B0604020202020204" pitchFamily="34" charset="0"/>
+              <a:hlinkClick r:id="rId4">
+                <a:extLst>
+                  <a:ext uri="{A12FA001-AC4F-418D-AE19-62706E023703}">
+                    <ahyp:hlinkClr xmlns:ahyp="http://schemas.microsoft.com/office/drawing/2018/hyperlinkcolor" val="tx"/>
+                  </a:ext>
+                </a:extLst>
+              </a:hlinkClick>
+            </a:endParaRPr>
+          </a:p>
+          <a:p>
+            <a:pPr marL="0" indent="0">
+              <a:buNone/>
+            </a:pPr>
+            <a:r>
+              <a:rPr lang="en-US" sz="1600" dirty="0">
+                <a:solidFill>
+                  <a:srgbClr val="0070C0"/>
+                </a:solidFill>
+                <a:latin typeface="Abadi" panose="020B0604020202020204" pitchFamily="34" charset="0"/>
+                <a:hlinkClick r:id="rId4">
+                  <a:extLst>
+                    <a:ext uri="{A12FA001-AC4F-418D-AE19-62706E023703}">
+                      <ahyp:hlinkClr xmlns:ahyp="http://schemas.microsoft.com/office/drawing/2018/hyperlinkcolor" val="tx"/>
+                    </a:ext>
+                  </a:extLst>
+                </a:hlinkClick>
+              </a:rPr>
+              <a:t>https://dotnetfiddle.net/gLt1QD</a:t>
+            </a:r>
+            <a:r>
+              <a:rPr lang="en-US" sz="1600" dirty="0">
+                <a:solidFill>
+                  <a:srgbClr val="0070C0"/>
+                </a:solidFill>
+                <a:latin typeface="Abadi" panose="020B0604020202020204" pitchFamily="34" charset="0"/>
+              </a:rPr>
+              <a:t>  	</a:t>
+            </a:r>
+            <a:r>
+              <a:rPr lang="en-US" sz="1200" dirty="0">
+                <a:solidFill>
+                  <a:schemeClr val="tx1"/>
+                </a:solidFill>
+                <a:latin typeface="Abadi" panose="020B0604020202020204" pitchFamily="34" charset="0"/>
+              </a:rPr>
+              <a:t>(in-depth examples)</a:t>
+            </a:r>
+          </a:p>
+          <a:p>
+            <a:pPr marL="0" indent="0">
+              <a:buNone/>
+            </a:pPr>
+            <a:endParaRPr lang="en-US" sz="1600" dirty="0">
+              <a:solidFill>
+                <a:srgbClr val="0070C0"/>
+              </a:solidFill>
+              <a:latin typeface="Abadi" panose="020B0604020202020204" pitchFamily="34" charset="0"/>
+              <a:hlinkClick r:id="rId2">
+                <a:extLst>
+                  <a:ext uri="{A12FA001-AC4F-418D-AE19-62706E023703}">
+                    <ahyp:hlinkClr xmlns:ahyp="http://schemas.microsoft.com/office/drawing/2018/hyperlinkcolor" val="tx"/>
+                  </a:ext>
+                </a:extLst>
+              </a:hlinkClick>
+            </a:endParaRPr>
+          </a:p>
+          <a:p>
+            <a:pPr marL="0" indent="0">
+              <a:buNone/>
+            </a:pPr>
+            <a:r>
+              <a:rPr lang="en-US" sz="1600" dirty="0">
+                <a:solidFill>
+                  <a:srgbClr val="0070C0"/>
+                </a:solidFill>
+                <a:latin typeface="Abadi" panose="020B0604020202020204" pitchFamily="34" charset="0"/>
+                <a:hlinkClick r:id="rId5">
+                  <a:extLst>
+                    <a:ext uri="{A12FA001-AC4F-418D-AE19-62706E023703}">
+                      <ahyp:hlinkClr xmlns:ahyp="http://schemas.microsoft.com/office/drawing/2018/hyperlinkcolor" val="tx"/>
+                    </a:ext>
+                  </a:extLst>
+                </a:hlinkClick>
+              </a:rPr>
+              <a:t>https://github.com/DonnieSantos/IT-1050/tree/master/2022</a:t>
+            </a:r>
+            <a:endParaRPr lang="en-US" sz="1600" dirty="0">
+              <a:solidFill>
+                <a:srgbClr val="0070C0"/>
+              </a:solidFill>
+              <a:latin typeface="Abadi" panose="020B0604020202020204" pitchFamily="34" charset="0"/>
+              <a:hlinkClick r:id="rId2">
+                <a:extLst>
+                  <a:ext uri="{A12FA001-AC4F-418D-AE19-62706E023703}">
+                    <ahyp:hlinkClr xmlns:ahyp="http://schemas.microsoft.com/office/drawing/2018/hyperlinkcolor" val="tx"/>
+                  </a:ext>
+                </a:extLst>
+              </a:hlinkClick>
+            </a:endParaRPr>
+          </a:p>
+          <a:p>
+            <a:pPr marL="0" indent="0">
+              <a:buNone/>
+            </a:pPr>
+            <a:r>
+              <a:rPr lang="en-US" sz="1600" dirty="0">
                 <a:solidFill>
                   <a:srgbClr val="0070C0"/>
                 </a:solidFill>
@@ -9986,7 +10174,7 @@
               </a:rPr>
               <a:t>https://github.com/DonnieSantos/IT-1050/tree/master/2022/Part8_Methods</a:t>
             </a:r>
-            <a:endParaRPr lang="en-US" sz="2000" dirty="0">
+            <a:endParaRPr lang="en-US" sz="1600" dirty="0">
               <a:solidFill>
                 <a:srgbClr val="0070C0"/>
               </a:solidFill>
@@ -9998,12 +10186,12 @@
               <a:buNone/>
             </a:pPr>
             <a:r>
-              <a:rPr lang="en-US" sz="2000" dirty="0">
+              <a:rPr lang="en-US" sz="1600" dirty="0">
                 <a:solidFill>
                   <a:srgbClr val="0070C0"/>
                 </a:solidFill>
                 <a:latin typeface="Abadi" panose="020B0604020202020204" pitchFamily="34" charset="0"/>
-                <a:hlinkClick r:id="rId3">
+                <a:hlinkClick r:id="rId6">
                   <a:extLst>
                     <a:ext uri="{A12FA001-AC4F-418D-AE19-62706E023703}">
                       <ahyp:hlinkClr xmlns:ahyp="http://schemas.microsoft.com/office/drawing/2018/hyperlinkcolor" val="tx"/>
@@ -10011,9 +10199,9 @@
                   </a:extLst>
                 </a:hlinkClick>
               </a:rPr>
-              <a:t>https://dotnetfiddle.net/gLt1QD</a:t>
-            </a:r>
-            <a:endParaRPr lang="en-US" sz="2000" dirty="0">
+              <a:t>https://github.com/DonnieSantos/IT-1050/blob/master/2022/Part8_Methods/PowerPoint/Methods.pptx</a:t>
+            </a:r>
+            <a:endParaRPr lang="en-US" sz="1600" dirty="0">
               <a:solidFill>
                 <a:srgbClr val="0070C0"/>
               </a:solidFill>

</xml_diff>